<commit_message>
Revert "new CRC model"
</commit_message>
<xml_diff>
--- a/phase0/CRC MODEL.pptx
+++ b/phase0/CRC MODEL.pptx
@@ -5,7 +5,7 @@
     <p:sldMasterId id="2147483648" r:id="rId1"/>
   </p:sldMasterIdLst>
   <p:notesMasterIdLst>
-    <p:notesMasterId r:id="rId12"/>
+    <p:notesMasterId r:id="rId10"/>
   </p:notesMasterIdLst>
   <p:sldIdLst>
     <p:sldId id="256" r:id="rId2"/>
@@ -16,8 +16,6 @@
     <p:sldId id="261" r:id="rId7"/>
     <p:sldId id="262" r:id="rId8"/>
     <p:sldId id="263" r:id="rId9"/>
-    <p:sldId id="264" r:id="rId10"/>
-    <p:sldId id="265" r:id="rId11"/>
   </p:sldIdLst>
   <p:sldSz cx="12192000" cy="6858000"/>
   <p:notesSz cx="6858000" cy="9144000"/>
@@ -319,11 +317,6 @@
       </a:defRPr>
     </a:lvl9pPr>
   </p:defaultTextStyle>
-  <p:extLst>
-    <p:ext uri="{EFAFB233-063F-42B5-8137-9DF3F51BA10A}">
-      <p15:sldGuideLst xmlns:p15="http://schemas.microsoft.com/office/powerpoint/2012/main"/>
-    </p:ext>
-  </p:extLst>
 </p:presentation>
 </file>
 
@@ -1857,7 +1850,7 @@
           </a:ln>
           <a:extLst>
             <a:ext uri="{C572A759-6A51-4108-AA02-DFA0A04FC94B}">
-              <ma14:wrappingTextBoxFlag xmlns="" xmlns:m="http://schemas.openxmlformats.org/officeDocument/2006/math" xmlns:a14="http://schemas.microsoft.com/office/drawing/2010/main" xmlns:ma14="http://schemas.microsoft.com/office/mac/drawingml/2011/main" val="1"/>
+              <ma14:wrappingTextBoxFlag xmlns:ma14="http://schemas.microsoft.com/office/mac/drawingml/2011/main" xmlns:a14="http://schemas.microsoft.com/office/drawing/2010/main" xmlns:m="http://schemas.openxmlformats.org/officeDocument/2006/math" xmlns="" val="1"/>
             </a:ext>
           </a:extLst>
         </p:spPr>
@@ -1896,7 +1889,7 @@
           </a:ln>
           <a:extLst>
             <a:ext uri="{C572A759-6A51-4108-AA02-DFA0A04FC94B}">
-              <ma14:wrappingTextBoxFlag xmlns="" xmlns:m="http://schemas.openxmlformats.org/officeDocument/2006/math" xmlns:a14="http://schemas.microsoft.com/office/drawing/2010/main" xmlns:ma14="http://schemas.microsoft.com/office/mac/drawingml/2011/main" val="1"/>
+              <ma14:wrappingTextBoxFlag xmlns:ma14="http://schemas.microsoft.com/office/mac/drawingml/2011/main" xmlns:a14="http://schemas.microsoft.com/office/drawing/2010/main" xmlns:m="http://schemas.openxmlformats.org/officeDocument/2006/math" xmlns="" val="1"/>
             </a:ext>
           </a:extLst>
         </p:spPr>
@@ -2792,319 +2785,6 @@
 </p:sld>
 </file>
 
-<file path=ppt/slides/slide10.xml><?xml version="1.0" encoding="utf-8"?>
-<p:sld xmlns:a="http://schemas.openxmlformats.org/drawingml/2006/main" xmlns:r="http://schemas.openxmlformats.org/officeDocument/2006/relationships" xmlns:p="http://schemas.openxmlformats.org/presentationml/2006/main">
-  <p:cSld>
-    <p:spTree>
-      <p:nvGrpSpPr>
-        <p:cNvPr id="1" name=""/>
-        <p:cNvGrpSpPr/>
-        <p:nvPr/>
-      </p:nvGrpSpPr>
-      <p:grpSpPr>
-        <a:xfrm>
-          <a:off x="0" y="0"/>
-          <a:ext cx="0" cy="0"/>
-          <a:chOff x="0" y="0"/>
-          <a:chExt cx="0" cy="0"/>
-        </a:xfrm>
-      </p:grpSpPr>
-      <p:sp>
-        <p:nvSpPr>
-          <p:cNvPr id="121" name="Title 1"/>
-          <p:cNvSpPr txBox="1">
-            <a:spLocks noGrp="1"/>
-          </p:cNvSpPr>
-          <p:nvPr>
-            <p:ph type="title"/>
-          </p:nvPr>
-        </p:nvSpPr>
-        <p:spPr>
-          <a:xfrm>
-            <a:off x="838200" y="365125"/>
-            <a:ext cx="10515600" cy="1325563"/>
-          </a:xfrm>
-          <a:prstGeom prst="rect">
-            <a:avLst/>
-          </a:prstGeom>
-          <a:solidFill>
-            <a:srgbClr val="FFFFFF"/>
-          </a:solidFill>
-          <a:ln>
-            <a:solidFill>
-              <a:srgbClr val="000000"/>
-            </a:solidFill>
-            <a:miter lim="800000"/>
-          </a:ln>
-        </p:spPr>
-        <p:txBody>
-          <a:bodyPr/>
-          <a:lstStyle>
-            <a:lvl1pPr algn="ctr">
-              <a:defRPr>
-                <a:latin typeface="+mj-lt"/>
-                <a:ea typeface="+mj-ea"/>
-                <a:cs typeface="+mj-cs"/>
-                <a:sym typeface="等线"/>
-              </a:defRPr>
-            </a:lvl1pPr>
-          </a:lstStyle>
-          <a:p>
-            <a:r>
-              <a:rPr lang="en-US" dirty="0" err="1"/>
-              <a:t>Function</a:t>
-            </a:r>
-            <a:r>
-              <a:rPr dirty="0" err="1"/>
-              <a:t>Card</a:t>
-            </a:r>
-            <a:endParaRPr dirty="0"/>
-          </a:p>
-        </p:txBody>
-      </p:sp>
-      <p:sp>
-        <p:nvSpPr>
-          <p:cNvPr id="122" name="Content Placeholder 2"/>
-          <p:cNvSpPr txBox="1">
-            <a:spLocks noGrp="1"/>
-          </p:cNvSpPr>
-          <p:nvPr>
-            <p:ph type="body" sz="half" idx="1"/>
-          </p:nvPr>
-        </p:nvSpPr>
-        <p:spPr>
-          <a:xfrm>
-            <a:off x="838200" y="1825625"/>
-            <a:ext cx="5181600" cy="4351338"/>
-          </a:xfrm>
-          <a:prstGeom prst="rect">
-            <a:avLst/>
-          </a:prstGeom>
-          <a:solidFill>
-            <a:srgbClr val="FFFFFF"/>
-          </a:solidFill>
-          <a:ln>
-            <a:solidFill>
-              <a:srgbClr val="000000"/>
-            </a:solidFill>
-            <a:miter lim="800000"/>
-          </a:ln>
-        </p:spPr>
-        <p:txBody>
-          <a:bodyPr/>
-          <a:lstStyle/>
-          <a:p>
-            <a:r>
-              <a:rPr lang="en-US" dirty="0"/>
-              <a:t>Store and get the function of the card</a:t>
-            </a:r>
-          </a:p>
-          <a:p>
-            <a:r>
-              <a:rPr lang="en-US" altLang="zh-CN" dirty="0"/>
-              <a:t>Store and get the color, id of the card</a:t>
-            </a:r>
-          </a:p>
-          <a:p>
-            <a:r>
-              <a:rPr lang="en-US" altLang="zh-CN" dirty="0"/>
-              <a:t>Construct a null to represent the situation of “no card”</a:t>
-            </a:r>
-          </a:p>
-          <a:p>
-            <a:r>
-              <a:rPr lang="en-US" altLang="zh-CN" dirty="0"/>
-              <a:t>print the card</a:t>
-            </a:r>
-          </a:p>
-          <a:p>
-            <a:endParaRPr dirty="0"/>
-          </a:p>
-        </p:txBody>
-      </p:sp>
-      <p:sp>
-        <p:nvSpPr>
-          <p:cNvPr id="123" name="Content Placeholder 3"/>
-          <p:cNvSpPr/>
-          <p:nvPr/>
-        </p:nvSpPr>
-        <p:spPr>
-          <a:xfrm>
-            <a:off x="6172200" y="1825625"/>
-            <a:ext cx="5181600" cy="4351338"/>
-          </a:xfrm>
-          <a:prstGeom prst="rect">
-            <a:avLst/>
-          </a:prstGeom>
-          <a:solidFill>
-            <a:srgbClr val="FFFFFF"/>
-          </a:solidFill>
-          <a:ln w="12700">
-            <a:solidFill>
-              <a:srgbClr val="000000"/>
-            </a:solidFill>
-            <a:miter/>
-          </a:ln>
-        </p:spPr>
-        <p:txBody>
-          <a:bodyPr lIns="45719" rIns="45719"/>
-          <a:lstStyle/>
-          <a:p>
-            <a:pPr>
-              <a:lnSpc>
-                <a:spcPct val="90000"/>
-              </a:lnSpc>
-              <a:spcBef>
-                <a:spcPts val="1000"/>
-              </a:spcBef>
-              <a:defRPr sz="2800"/>
-            </a:pPr>
-            <a:r>
-              <a:rPr lang="en-US" dirty="0" err="1"/>
-              <a:t>DeckUseCase</a:t>
-            </a:r>
-            <a:endParaRPr lang="en-US" dirty="0"/>
-          </a:p>
-          <a:p>
-            <a:pPr>
-              <a:lnSpc>
-                <a:spcPct val="90000"/>
-              </a:lnSpc>
-              <a:spcBef>
-                <a:spcPts val="1000"/>
-              </a:spcBef>
-              <a:defRPr sz="2800"/>
-            </a:pPr>
-            <a:endParaRPr lang="en-US" dirty="0"/>
-          </a:p>
-          <a:p>
-            <a:pPr>
-              <a:lnSpc>
-                <a:spcPct val="90000"/>
-              </a:lnSpc>
-              <a:spcBef>
-                <a:spcPts val="1000"/>
-              </a:spcBef>
-              <a:defRPr sz="2800"/>
-            </a:pPr>
-            <a:r>
-              <a:rPr lang="en-US" dirty="0"/>
-              <a:t>Deck</a:t>
-            </a:r>
-            <a:endParaRPr dirty="0"/>
-          </a:p>
-        </p:txBody>
-      </p:sp>
-      <p:sp>
-        <p:nvSpPr>
-          <p:cNvPr id="2" name="TextBox 1">
-            <a:extLst>
-              <a:ext uri="{FF2B5EF4-FFF2-40B4-BE49-F238E27FC236}">
-                <a16:creationId xmlns:a16="http://schemas.microsoft.com/office/drawing/2014/main" id="{35C47094-B2F3-415C-9093-B350401FF6D4}"/>
-              </a:ext>
-            </a:extLst>
-          </p:cNvPr>
-          <p:cNvSpPr txBox="1"/>
-          <p:nvPr/>
-        </p:nvSpPr>
-        <p:spPr>
-          <a:xfrm>
-            <a:off x="10550236" y="439088"/>
-            <a:ext cx="914400" cy="461663"/>
-          </a:xfrm>
-          <a:prstGeom prst="rect">
-            <a:avLst/>
-          </a:prstGeom>
-          <a:noFill/>
-          <a:ln w="12700" cap="flat">
-            <a:noFill/>
-            <a:miter lim="400000"/>
-          </a:ln>
-          <a:effectLst/>
-          <a:sp3d/>
-        </p:spPr>
-        <p:style>
-          <a:lnRef idx="0">
-            <a:scrgbClr r="0" g="0" b="0"/>
-          </a:lnRef>
-          <a:fillRef idx="0">
-            <a:scrgbClr r="0" g="0" b="0"/>
-          </a:fillRef>
-          <a:effectRef idx="0">
-            <a:scrgbClr r="0" g="0" b="0"/>
-          </a:effectRef>
-          <a:fontRef idx="none"/>
-        </p:style>
-        <p:txBody>
-          <a:bodyPr rot="0" spcFirstLastPara="1" vertOverflow="overflow" horzOverflow="overflow" vert="horz" wrap="square" lIns="45719" tIns="45719" rIns="45719" bIns="45719" numCol="1" spcCol="38100" rtlCol="0" anchor="t">
-            <a:spAutoFit/>
-          </a:bodyPr>
-          <a:lstStyle/>
-          <a:p>
-            <a:pPr marL="0" marR="0" indent="0" algn="l" defTabSz="914400" rtl="0" fontAlgn="auto" latinLnBrk="0" hangingPunct="0">
-              <a:lnSpc>
-                <a:spcPct val="100000"/>
-              </a:lnSpc>
-              <a:spcBef>
-                <a:spcPts val="0"/>
-              </a:spcBef>
-              <a:spcAft>
-                <a:spcPts val="0"/>
-              </a:spcAft>
-              <a:buClrTx/>
-              <a:buSzTx/>
-              <a:buFontTx/>
-              <a:buNone/>
-              <a:tabLst/>
-            </a:pPr>
-            <a:r>
-              <a:rPr kumimoji="0" lang="en-US" altLang="zh-CN" sz="2400" b="0" i="0" u="none" strike="noStrike" cap="none" spc="0" normalizeH="0" baseline="0" dirty="0">
-                <a:ln>
-                  <a:noFill/>
-                </a:ln>
-                <a:solidFill>
-                  <a:srgbClr val="000000"/>
-                </a:solidFill>
-                <a:effectLst/>
-                <a:uFillTx/>
-                <a:latin typeface="+mj-lt"/>
-                <a:ea typeface="+mj-ea"/>
-                <a:cs typeface="+mj-cs"/>
-                <a:sym typeface="等线"/>
-              </a:rPr>
-              <a:t>Card</a:t>
-            </a:r>
-            <a:endParaRPr kumimoji="0" lang="zh-CN" altLang="en-US" sz="2400" b="0" i="0" u="none" strike="noStrike" cap="none" spc="0" normalizeH="0" baseline="0" dirty="0">
-              <a:ln>
-                <a:noFill/>
-              </a:ln>
-              <a:solidFill>
-                <a:srgbClr val="000000"/>
-              </a:solidFill>
-              <a:effectLst/>
-              <a:uFillTx/>
-              <a:latin typeface="+mj-lt"/>
-              <a:ea typeface="+mj-ea"/>
-              <a:cs typeface="+mj-cs"/>
-              <a:sym typeface="等线"/>
-            </a:endParaRPr>
-          </a:p>
-        </p:txBody>
-      </p:sp>
-    </p:spTree>
-    <p:extLst>
-      <p:ext uri="{BB962C8B-B14F-4D97-AF65-F5344CB8AC3E}">
-        <p14:creationId xmlns:p14="http://schemas.microsoft.com/office/powerpoint/2010/main" val="3749984980"/>
-      </p:ext>
-    </p:extLst>
-  </p:cSld>
-  <p:clrMapOvr>
-    <a:masterClrMapping/>
-  </p:clrMapOvr>
-  <p:transition spd="med"/>
-</p:sld>
-</file>
-
 <file path=ppt/slides/slide2.xml><?xml version="1.0" encoding="utf-8"?>
 <p:sld xmlns:a="http://schemas.openxmlformats.org/drawingml/2006/main" xmlns:r="http://schemas.openxmlformats.org/officeDocument/2006/relationships" xmlns:p="http://schemas.openxmlformats.org/presentationml/2006/main">
   <p:cSld>
@@ -3449,7 +3129,7 @@
           </a:ln>
           <a:extLst>
             <a:ext uri="{C572A759-6A51-4108-AA02-DFA0A04FC94B}">
-              <ma14:wrappingTextBoxFlag xmlns="" xmlns:m="http://schemas.openxmlformats.org/officeDocument/2006/math" xmlns:a14="http://schemas.microsoft.com/office/drawing/2010/main" xmlns:ma14="http://schemas.microsoft.com/office/mac/drawingml/2011/main" val="1"/>
+              <ma14:wrappingTextBoxFlag xmlns:ma14="http://schemas.microsoft.com/office/mac/drawingml/2011/main" xmlns:a14="http://schemas.microsoft.com/office/drawing/2010/main" xmlns:m="http://schemas.openxmlformats.org/officeDocument/2006/math" xmlns="" val="1"/>
             </a:ext>
           </a:extLst>
         </p:spPr>
@@ -3749,7 +3429,7 @@
           </a:ln>
           <a:extLst>
             <a:ext uri="{C572A759-6A51-4108-AA02-DFA0A04FC94B}">
-              <ma14:wrappingTextBoxFlag xmlns="" xmlns:m="http://schemas.openxmlformats.org/officeDocument/2006/math" xmlns:a14="http://schemas.microsoft.com/office/drawing/2010/main" xmlns:ma14="http://schemas.microsoft.com/office/mac/drawingml/2011/main" val="1"/>
+              <ma14:wrappingTextBoxFlag xmlns:ma14="http://schemas.microsoft.com/office/mac/drawingml/2011/main" xmlns:a14="http://schemas.microsoft.com/office/drawing/2010/main" xmlns:m="http://schemas.openxmlformats.org/officeDocument/2006/math" xmlns="" val="1"/>
             </a:ext>
           </a:extLst>
         </p:spPr>
@@ -4075,7 +3755,7 @@
           </a:ln>
           <a:extLst>
             <a:ext uri="{C572A759-6A51-4108-AA02-DFA0A04FC94B}">
-              <ma14:wrappingTextBoxFlag xmlns="" xmlns:m="http://schemas.openxmlformats.org/officeDocument/2006/math" xmlns:a14="http://schemas.microsoft.com/office/drawing/2010/main" xmlns:ma14="http://schemas.microsoft.com/office/mac/drawingml/2011/main" val="1"/>
+              <ma14:wrappingTextBoxFlag xmlns:ma14="http://schemas.microsoft.com/office/mac/drawingml/2011/main" xmlns:a14="http://schemas.microsoft.com/office/drawing/2010/main" xmlns:m="http://schemas.openxmlformats.org/officeDocument/2006/math" xmlns="" val="1"/>
             </a:ext>
           </a:extLst>
         </p:spPr>
@@ -4749,13 +4429,7 @@
           <a:p>
             <a:r>
               <a:rPr lang="en-US" dirty="0"/>
-              <a:t>Store and get the color, id of the card</a:t>
-            </a:r>
-          </a:p>
-          <a:p>
-            <a:r>
-              <a:rPr lang="en-US" dirty="0"/>
-              <a:t>Construct a null to represent the situation of “no card”</a:t>
+              <a:t>Store and get the color, number, function, id of the card</a:t>
             </a:r>
           </a:p>
           <a:p>
@@ -4841,323 +4515,6 @@
         </p:txBody>
       </p:sp>
     </p:spTree>
-  </p:cSld>
-  <p:clrMapOvr>
-    <a:masterClrMapping/>
-  </p:clrMapOvr>
-  <p:transition spd="med"/>
-</p:sld>
-</file>
-
-<file path=ppt/slides/slide9.xml><?xml version="1.0" encoding="utf-8"?>
-<p:sld xmlns:a="http://schemas.openxmlformats.org/drawingml/2006/main" xmlns:r="http://schemas.openxmlformats.org/officeDocument/2006/relationships" xmlns:p="http://schemas.openxmlformats.org/presentationml/2006/main">
-  <p:cSld>
-    <p:spTree>
-      <p:nvGrpSpPr>
-        <p:cNvPr id="1" name=""/>
-        <p:cNvGrpSpPr/>
-        <p:nvPr/>
-      </p:nvGrpSpPr>
-      <p:grpSpPr>
-        <a:xfrm>
-          <a:off x="0" y="0"/>
-          <a:ext cx="0" cy="0"/>
-          <a:chOff x="0" y="0"/>
-          <a:chExt cx="0" cy="0"/>
-        </a:xfrm>
-      </p:grpSpPr>
-      <p:sp>
-        <p:nvSpPr>
-          <p:cNvPr id="121" name="Title 1"/>
-          <p:cNvSpPr txBox="1">
-            <a:spLocks noGrp="1"/>
-          </p:cNvSpPr>
-          <p:nvPr>
-            <p:ph type="title"/>
-          </p:nvPr>
-        </p:nvSpPr>
-        <p:spPr>
-          <a:xfrm>
-            <a:off x="838200" y="365125"/>
-            <a:ext cx="10515600" cy="1325563"/>
-          </a:xfrm>
-          <a:prstGeom prst="rect">
-            <a:avLst/>
-          </a:prstGeom>
-          <a:solidFill>
-            <a:srgbClr val="FFFFFF"/>
-          </a:solidFill>
-          <a:ln>
-            <a:solidFill>
-              <a:srgbClr val="000000"/>
-            </a:solidFill>
-            <a:miter lim="800000"/>
-          </a:ln>
-        </p:spPr>
-        <p:txBody>
-          <a:bodyPr/>
-          <a:lstStyle>
-            <a:lvl1pPr algn="ctr">
-              <a:defRPr>
-                <a:latin typeface="+mj-lt"/>
-                <a:ea typeface="+mj-ea"/>
-                <a:cs typeface="+mj-cs"/>
-                <a:sym typeface="等线"/>
-              </a:defRPr>
-            </a:lvl1pPr>
-          </a:lstStyle>
-          <a:p>
-            <a:r>
-              <a:rPr lang="en-US" dirty="0" err="1"/>
-              <a:t>N</a:t>
-            </a:r>
-            <a:r>
-              <a:rPr lang="en-US" altLang="zh-CN" dirty="0" err="1"/>
-              <a:t>umber</a:t>
-            </a:r>
-            <a:r>
-              <a:rPr dirty="0" err="1"/>
-              <a:t>Card</a:t>
-            </a:r>
-            <a:endParaRPr dirty="0"/>
-          </a:p>
-        </p:txBody>
-      </p:sp>
-      <p:sp>
-        <p:nvSpPr>
-          <p:cNvPr id="122" name="Content Placeholder 2"/>
-          <p:cNvSpPr txBox="1">
-            <a:spLocks noGrp="1"/>
-          </p:cNvSpPr>
-          <p:nvPr>
-            <p:ph type="body" sz="half" idx="1"/>
-          </p:nvPr>
-        </p:nvSpPr>
-        <p:spPr>
-          <a:xfrm>
-            <a:off x="838200" y="1825625"/>
-            <a:ext cx="5181600" cy="4351338"/>
-          </a:xfrm>
-          <a:prstGeom prst="rect">
-            <a:avLst/>
-          </a:prstGeom>
-          <a:solidFill>
-            <a:srgbClr val="FFFFFF"/>
-          </a:solidFill>
-          <a:ln>
-            <a:solidFill>
-              <a:srgbClr val="000000"/>
-            </a:solidFill>
-            <a:miter lim="800000"/>
-          </a:ln>
-        </p:spPr>
-        <p:txBody>
-          <a:bodyPr/>
-          <a:lstStyle/>
-          <a:p>
-            <a:r>
-              <a:rPr lang="en-US" dirty="0"/>
-              <a:t>Store and get the number of the card</a:t>
-            </a:r>
-          </a:p>
-          <a:p>
-            <a:r>
-              <a:rPr lang="en-US" altLang="zh-CN" dirty="0"/>
-              <a:t>Store and get the color, id of the card</a:t>
-            </a:r>
-          </a:p>
-          <a:p>
-            <a:r>
-              <a:rPr lang="en-US" altLang="zh-CN" dirty="0"/>
-              <a:t>Construct a null to represent the situation of “no card”</a:t>
-            </a:r>
-          </a:p>
-          <a:p>
-            <a:r>
-              <a:rPr lang="en-US" altLang="zh-CN" dirty="0"/>
-              <a:t>print the card</a:t>
-            </a:r>
-          </a:p>
-          <a:p>
-            <a:endParaRPr dirty="0"/>
-          </a:p>
-        </p:txBody>
-      </p:sp>
-      <p:sp>
-        <p:nvSpPr>
-          <p:cNvPr id="123" name="Content Placeholder 3"/>
-          <p:cNvSpPr/>
-          <p:nvPr/>
-        </p:nvSpPr>
-        <p:spPr>
-          <a:xfrm>
-            <a:off x="6172200" y="1825625"/>
-            <a:ext cx="5181600" cy="4351338"/>
-          </a:xfrm>
-          <a:prstGeom prst="rect">
-            <a:avLst/>
-          </a:prstGeom>
-          <a:solidFill>
-            <a:srgbClr val="FFFFFF"/>
-          </a:solidFill>
-          <a:ln w="12700">
-            <a:solidFill>
-              <a:srgbClr val="000000"/>
-            </a:solidFill>
-            <a:miter/>
-          </a:ln>
-        </p:spPr>
-        <p:txBody>
-          <a:bodyPr lIns="45719" rIns="45719"/>
-          <a:lstStyle/>
-          <a:p>
-            <a:pPr>
-              <a:lnSpc>
-                <a:spcPct val="90000"/>
-              </a:lnSpc>
-              <a:spcBef>
-                <a:spcPts val="1000"/>
-              </a:spcBef>
-              <a:defRPr sz="2800"/>
-            </a:pPr>
-            <a:r>
-              <a:rPr lang="en-US" dirty="0" err="1"/>
-              <a:t>DeckUseCase</a:t>
-            </a:r>
-            <a:endParaRPr lang="en-US" dirty="0"/>
-          </a:p>
-          <a:p>
-            <a:pPr>
-              <a:lnSpc>
-                <a:spcPct val="90000"/>
-              </a:lnSpc>
-              <a:spcBef>
-                <a:spcPts val="1000"/>
-              </a:spcBef>
-              <a:defRPr sz="2800"/>
-            </a:pPr>
-            <a:endParaRPr lang="en-US" dirty="0"/>
-          </a:p>
-          <a:p>
-            <a:pPr>
-              <a:lnSpc>
-                <a:spcPct val="90000"/>
-              </a:lnSpc>
-              <a:spcBef>
-                <a:spcPts val="1000"/>
-              </a:spcBef>
-              <a:defRPr sz="2800"/>
-            </a:pPr>
-            <a:r>
-              <a:rPr lang="en-US" dirty="0"/>
-              <a:t>Deck</a:t>
-            </a:r>
-            <a:endParaRPr dirty="0"/>
-          </a:p>
-        </p:txBody>
-      </p:sp>
-      <p:sp>
-        <p:nvSpPr>
-          <p:cNvPr id="2" name="TextBox 1">
-            <a:extLst>
-              <a:ext uri="{FF2B5EF4-FFF2-40B4-BE49-F238E27FC236}">
-                <a16:creationId xmlns:a16="http://schemas.microsoft.com/office/drawing/2014/main" id="{35C47094-B2F3-415C-9093-B350401FF6D4}"/>
-              </a:ext>
-            </a:extLst>
-          </p:cNvPr>
-          <p:cNvSpPr txBox="1"/>
-          <p:nvPr/>
-        </p:nvSpPr>
-        <p:spPr>
-          <a:xfrm>
-            <a:off x="10550236" y="439088"/>
-            <a:ext cx="914400" cy="461663"/>
-          </a:xfrm>
-          <a:prstGeom prst="rect">
-            <a:avLst/>
-          </a:prstGeom>
-          <a:noFill/>
-          <a:ln w="12700" cap="flat">
-            <a:noFill/>
-            <a:miter lim="400000"/>
-          </a:ln>
-          <a:effectLst/>
-          <a:sp3d/>
-        </p:spPr>
-        <p:style>
-          <a:lnRef idx="0">
-            <a:scrgbClr r="0" g="0" b="0"/>
-          </a:lnRef>
-          <a:fillRef idx="0">
-            <a:scrgbClr r="0" g="0" b="0"/>
-          </a:fillRef>
-          <a:effectRef idx="0">
-            <a:scrgbClr r="0" g="0" b="0"/>
-          </a:effectRef>
-          <a:fontRef idx="none"/>
-        </p:style>
-        <p:txBody>
-          <a:bodyPr rot="0" spcFirstLastPara="1" vertOverflow="overflow" horzOverflow="overflow" vert="horz" wrap="square" lIns="45719" tIns="45719" rIns="45719" bIns="45719" numCol="1" spcCol="38100" rtlCol="0" anchor="t">
-            <a:spAutoFit/>
-          </a:bodyPr>
-          <a:lstStyle/>
-          <a:p>
-            <a:pPr marL="0" marR="0" indent="0" algn="l" defTabSz="914400" rtl="0" fontAlgn="auto" latinLnBrk="0" hangingPunct="0">
-              <a:lnSpc>
-                <a:spcPct val="100000"/>
-              </a:lnSpc>
-              <a:spcBef>
-                <a:spcPts val="0"/>
-              </a:spcBef>
-              <a:spcAft>
-                <a:spcPts val="0"/>
-              </a:spcAft>
-              <a:buClrTx/>
-              <a:buSzTx/>
-              <a:buFontTx/>
-              <a:buNone/>
-              <a:tabLst/>
-            </a:pPr>
-            <a:r>
-              <a:rPr kumimoji="0" lang="en-US" altLang="zh-CN" sz="2400" b="0" i="0" u="none" strike="noStrike" cap="none" spc="0" normalizeH="0" baseline="0" dirty="0">
-                <a:ln>
-                  <a:noFill/>
-                </a:ln>
-                <a:solidFill>
-                  <a:srgbClr val="000000"/>
-                </a:solidFill>
-                <a:effectLst/>
-                <a:uFillTx/>
-                <a:latin typeface="+mj-lt"/>
-                <a:ea typeface="+mj-ea"/>
-                <a:cs typeface="+mj-cs"/>
-                <a:sym typeface="等线"/>
-              </a:rPr>
-              <a:t>Card</a:t>
-            </a:r>
-            <a:endParaRPr kumimoji="0" lang="zh-CN" altLang="en-US" sz="2400" b="0" i="0" u="none" strike="noStrike" cap="none" spc="0" normalizeH="0" baseline="0" dirty="0">
-              <a:ln>
-                <a:noFill/>
-              </a:ln>
-              <a:solidFill>
-                <a:srgbClr val="000000"/>
-              </a:solidFill>
-              <a:effectLst/>
-              <a:uFillTx/>
-              <a:latin typeface="+mj-lt"/>
-              <a:ea typeface="+mj-ea"/>
-              <a:cs typeface="+mj-cs"/>
-              <a:sym typeface="等线"/>
-            </a:endParaRPr>
-          </a:p>
-        </p:txBody>
-      </p:sp>
-    </p:spTree>
-    <p:extLst>
-      <p:ext uri="{BB962C8B-B14F-4D97-AF65-F5344CB8AC3E}">
-        <p14:creationId xmlns:p14="http://schemas.microsoft.com/office/powerpoint/2010/main" val="1998826436"/>
-      </p:ext>
-    </p:extLst>
   </p:cSld>
   <p:clrMapOvr>
     <a:masterClrMapping/>

</xml_diff>